<commit_message>
Resources and thesis directories updated.
</commit_message>
<xml_diff>
--- a/resources/Software-Architecture-S/Presentation-Part1-Fundamentals-And-Essentials.pptx
+++ b/resources/Software-Architecture-S/Presentation-Part1-Fundamentals-And-Essentials.pptx
@@ -24,8 +24,8 @@
     <p:sldId id="720" r:id="rId15"/>
     <p:sldId id="721" r:id="rId16"/>
     <p:sldId id="722" r:id="rId17"/>
-    <p:sldId id="723" r:id="rId18"/>
-    <p:sldId id="724" r:id="rId19"/>
+    <p:sldId id="724" r:id="rId18"/>
+    <p:sldId id="723" r:id="rId19"/>
     <p:sldId id="725" r:id="rId20"/>
     <p:sldId id="726" r:id="rId21"/>
     <p:sldId id="727" r:id="rId22"/>
@@ -554,7 +554,7 @@
           <a:noFill/>
           <a:extLst>
             <a:ext uri="{909E8E84-426E-40dd-AFC4-6F175D3DCCD1}">
-              <a14:hiddenFill xmlns:a14="http://schemas.microsoft.com/office/drawing/2010/main" xmlns="">
+              <a14:hiddenFill xmlns="" xmlns:a14="http://schemas.microsoft.com/office/drawing/2010/main">
                 <a:solidFill>
                   <a:srgbClr val="FFFFFF"/>
                 </a:solidFill>
@@ -614,7 +614,7 @@
             </a:ln>
             <a:extLst>
               <a:ext uri="{91240B29-F687-4f45-9708-019B960494DF}">
-                <a14:hiddenLine xmlns:a14="http://schemas.microsoft.com/office/drawing/2010/main" xmlns="" w="9525">
+                <a14:hiddenLine xmlns="" xmlns:a14="http://schemas.microsoft.com/office/drawing/2010/main" w="9525">
                   <a:solidFill>
                     <a:srgbClr val="000000"/>
                   </a:solidFill>
@@ -704,7 +704,7 @@
             </a:ln>
             <a:extLst>
               <a:ext uri="{91240B29-F687-4f45-9708-019B960494DF}">
-                <a14:hiddenLine xmlns:a14="http://schemas.microsoft.com/office/drawing/2010/main" xmlns="" w="9525">
+                <a14:hiddenLine xmlns="" xmlns:a14="http://schemas.microsoft.com/office/drawing/2010/main" w="9525">
                   <a:solidFill>
                     <a:srgbClr val="000000"/>
                   </a:solidFill>
@@ -794,7 +794,7 @@
             </a:ln>
             <a:extLst>
               <a:ext uri="{91240B29-F687-4f45-9708-019B960494DF}">
-                <a14:hiddenLine xmlns:a14="http://schemas.microsoft.com/office/drawing/2010/main" xmlns="" w="9525">
+                <a14:hiddenLine xmlns="" xmlns:a14="http://schemas.microsoft.com/office/drawing/2010/main" w="9525">
                   <a:solidFill>
                     <a:srgbClr val="000000"/>
                   </a:solidFill>
@@ -828,7 +828,7 @@
             </a:ln>
             <a:extLst>
               <a:ext uri="{91240B29-F687-4f45-9708-019B960494DF}">
-                <a14:hiddenLine xmlns:a14="http://schemas.microsoft.com/office/drawing/2010/main" xmlns="" w="9525">
+                <a14:hiddenLine xmlns="" xmlns:a14="http://schemas.microsoft.com/office/drawing/2010/main" w="9525">
                   <a:solidFill>
                     <a:srgbClr val="000000"/>
                   </a:solidFill>
@@ -918,7 +918,7 @@
             </a:ln>
             <a:extLst>
               <a:ext uri="{91240B29-F687-4f45-9708-019B960494DF}">
-                <a14:hiddenLine xmlns:a14="http://schemas.microsoft.com/office/drawing/2010/main" xmlns="" w="9525">
+                <a14:hiddenLine xmlns="" xmlns:a14="http://schemas.microsoft.com/office/drawing/2010/main" w="9525">
                   <a:solidFill>
                     <a:srgbClr val="000000"/>
                   </a:solidFill>
@@ -980,7 +980,7 @@
             </a:ln>
             <a:extLst>
               <a:ext uri="{91240B29-F687-4f45-9708-019B960494DF}">
-                <a14:hiddenLine xmlns:a14="http://schemas.microsoft.com/office/drawing/2010/main" xmlns="" w="9525">
+                <a14:hiddenLine xmlns="" xmlns:a14="http://schemas.microsoft.com/office/drawing/2010/main" w="9525">
                   <a:solidFill>
                     <a:srgbClr val="000000"/>
                   </a:solidFill>
@@ -1042,7 +1042,7 @@
             </a:ln>
             <a:extLst>
               <a:ext uri="{91240B29-F687-4f45-9708-019B960494DF}">
-                <a14:hiddenLine xmlns:a14="http://schemas.microsoft.com/office/drawing/2010/main" xmlns="" w="9525">
+                <a14:hiddenLine xmlns="" xmlns:a14="http://schemas.microsoft.com/office/drawing/2010/main" w="9525">
                   <a:solidFill>
                     <a:srgbClr val="000000"/>
                   </a:solidFill>
@@ -1132,7 +1132,7 @@
             </a:ln>
             <a:extLst>
               <a:ext uri="{91240B29-F687-4f45-9708-019B960494DF}">
-                <a14:hiddenLine xmlns:a14="http://schemas.microsoft.com/office/drawing/2010/main" xmlns="" w="9525">
+                <a14:hiddenLine xmlns="" xmlns:a14="http://schemas.microsoft.com/office/drawing/2010/main" w="9525">
                   <a:solidFill>
                     <a:srgbClr val="000000"/>
                   </a:solidFill>
@@ -1194,7 +1194,7 @@
             </a:ln>
             <a:extLst>
               <a:ext uri="{91240B29-F687-4f45-9708-019B960494DF}">
-                <a14:hiddenLine xmlns:a14="http://schemas.microsoft.com/office/drawing/2010/main" xmlns="" w="9525">
+                <a14:hiddenLine xmlns="" xmlns:a14="http://schemas.microsoft.com/office/drawing/2010/main" w="9525">
                   <a:solidFill>
                     <a:srgbClr val="000000"/>
                   </a:solidFill>
@@ -1256,7 +1256,7 @@
             </a:ln>
             <a:extLst>
               <a:ext uri="{91240B29-F687-4f45-9708-019B960494DF}">
-                <a14:hiddenLine xmlns:a14="http://schemas.microsoft.com/office/drawing/2010/main" xmlns="" w="9525">
+                <a14:hiddenLine xmlns="" xmlns:a14="http://schemas.microsoft.com/office/drawing/2010/main" w="9525">
                   <a:solidFill>
                     <a:srgbClr val="000000"/>
                   </a:solidFill>
@@ -1346,7 +1346,7 @@
             </a:ln>
             <a:extLst>
               <a:ext uri="{91240B29-F687-4f45-9708-019B960494DF}">
-                <a14:hiddenLine xmlns:a14="http://schemas.microsoft.com/office/drawing/2010/main" xmlns="" w="9525">
+                <a14:hiddenLine xmlns="" xmlns:a14="http://schemas.microsoft.com/office/drawing/2010/main" w="9525">
                   <a:solidFill>
                     <a:srgbClr val="000000"/>
                   </a:solidFill>
@@ -1436,7 +1436,7 @@
             </a:ln>
             <a:extLst>
               <a:ext uri="{91240B29-F687-4f45-9708-019B960494DF}">
-                <a14:hiddenLine xmlns:a14="http://schemas.microsoft.com/office/drawing/2010/main" xmlns="" w="9525">
+                <a14:hiddenLine xmlns="" xmlns:a14="http://schemas.microsoft.com/office/drawing/2010/main" w="9525">
                   <a:solidFill>
                     <a:srgbClr val="000000"/>
                   </a:solidFill>
@@ -1498,7 +1498,7 @@
             </a:ln>
             <a:extLst>
               <a:ext uri="{91240B29-F687-4f45-9708-019B960494DF}">
-                <a14:hiddenLine xmlns:a14="http://schemas.microsoft.com/office/drawing/2010/main" xmlns="" w="9525">
+                <a14:hiddenLine xmlns="" xmlns:a14="http://schemas.microsoft.com/office/drawing/2010/main" w="9525">
                   <a:solidFill>
                     <a:srgbClr val="000000"/>
                   </a:solidFill>
@@ -1608,7 +1608,7 @@
             </a:ln>
             <a:extLst>
               <a:ext uri="{91240B29-F687-4f45-9708-019B960494DF}">
-                <a14:hiddenLine xmlns:a14="http://schemas.microsoft.com/office/drawing/2010/main" xmlns="" w="9525">
+                <a14:hiddenLine xmlns="" xmlns:a14="http://schemas.microsoft.com/office/drawing/2010/main" w="9525">
                   <a:solidFill>
                     <a:srgbClr val="000000"/>
                   </a:solidFill>
@@ -1670,7 +1670,7 @@
             </a:ln>
             <a:extLst>
               <a:ext uri="{91240B29-F687-4f45-9708-019B960494DF}">
-                <a14:hiddenLine xmlns:a14="http://schemas.microsoft.com/office/drawing/2010/main" xmlns="" w="9525">
+                <a14:hiddenLine xmlns="" xmlns:a14="http://schemas.microsoft.com/office/drawing/2010/main" w="9525">
                   <a:solidFill>
                     <a:srgbClr val="000000"/>
                   </a:solidFill>
@@ -1760,7 +1760,7 @@
             </a:ln>
             <a:extLst>
               <a:ext uri="{91240B29-F687-4f45-9708-019B960494DF}">
-                <a14:hiddenLine xmlns:a14="http://schemas.microsoft.com/office/drawing/2010/main" xmlns="" w="9525">
+                <a14:hiddenLine xmlns="" xmlns:a14="http://schemas.microsoft.com/office/drawing/2010/main" w="9525">
                   <a:solidFill>
                     <a:srgbClr val="000000"/>
                   </a:solidFill>
@@ -1850,7 +1850,7 @@
             </a:ln>
             <a:extLst>
               <a:ext uri="{91240B29-F687-4f45-9708-019B960494DF}">
-                <a14:hiddenLine xmlns:a14="http://schemas.microsoft.com/office/drawing/2010/main" xmlns="" w="9525">
+                <a14:hiddenLine xmlns="" xmlns:a14="http://schemas.microsoft.com/office/drawing/2010/main" w="9525">
                   <a:solidFill>
                     <a:srgbClr val="000000"/>
                   </a:solidFill>
@@ -1912,7 +1912,7 @@
             </a:ln>
             <a:extLst>
               <a:ext uri="{91240B29-F687-4f45-9708-019B960494DF}">
-                <a14:hiddenLine xmlns:a14="http://schemas.microsoft.com/office/drawing/2010/main" xmlns="" w="9525">
+                <a14:hiddenLine xmlns="" xmlns:a14="http://schemas.microsoft.com/office/drawing/2010/main" w="9525">
                   <a:solidFill>
                     <a:srgbClr val="000000"/>
                   </a:solidFill>
@@ -2002,7 +2002,7 @@
             </a:ln>
             <a:extLst>
               <a:ext uri="{91240B29-F687-4f45-9708-019B960494DF}">
-                <a14:hiddenLine xmlns:a14="http://schemas.microsoft.com/office/drawing/2010/main" xmlns="" w="9525">
+                <a14:hiddenLine xmlns="" xmlns:a14="http://schemas.microsoft.com/office/drawing/2010/main" w="9525">
                   <a:solidFill>
                     <a:srgbClr val="000000"/>
                   </a:solidFill>
@@ -2092,7 +2092,7 @@
             </a:ln>
             <a:extLst>
               <a:ext uri="{91240B29-F687-4f45-9708-019B960494DF}">
-                <a14:hiddenLine xmlns:a14="http://schemas.microsoft.com/office/drawing/2010/main" xmlns="" w="9525">
+                <a14:hiddenLine xmlns="" xmlns:a14="http://schemas.microsoft.com/office/drawing/2010/main" w="9525">
                   <a:solidFill>
                     <a:srgbClr val="000000"/>
                   </a:solidFill>
@@ -2148,7 +2148,7 @@
             </a:ln>
             <a:extLst>
               <a:ext uri="{91240B29-F687-4f45-9708-019B960494DF}">
-                <a14:hiddenLine xmlns:a14="http://schemas.microsoft.com/office/drawing/2010/main" xmlns="" w="9525">
+                <a14:hiddenLine xmlns="" xmlns:a14="http://schemas.microsoft.com/office/drawing/2010/main" w="9525">
                   <a:solidFill>
                     <a:srgbClr val="000000"/>
                   </a:solidFill>
@@ -2238,7 +2238,7 @@
             </a:ln>
             <a:extLst>
               <a:ext uri="{91240B29-F687-4f45-9708-019B960494DF}">
-                <a14:hiddenLine xmlns:a14="http://schemas.microsoft.com/office/drawing/2010/main" xmlns="" w="9525">
+                <a14:hiddenLine xmlns="" xmlns:a14="http://schemas.microsoft.com/office/drawing/2010/main" w="9525">
                   <a:solidFill>
                     <a:srgbClr val="000000"/>
                   </a:solidFill>
@@ -2294,7 +2294,7 @@
             </a:ln>
             <a:extLst>
               <a:ext uri="{91240B29-F687-4f45-9708-019B960494DF}">
-                <a14:hiddenLine xmlns:a14="http://schemas.microsoft.com/office/drawing/2010/main" xmlns="" w="9525">
+                <a14:hiddenLine xmlns="" xmlns:a14="http://schemas.microsoft.com/office/drawing/2010/main" w="9525">
                   <a:solidFill>
                     <a:srgbClr val="000000"/>
                   </a:solidFill>
@@ -2384,7 +2384,7 @@
             </a:ln>
             <a:extLst>
               <a:ext uri="{91240B29-F687-4f45-9708-019B960494DF}">
-                <a14:hiddenLine xmlns:a14="http://schemas.microsoft.com/office/drawing/2010/main" xmlns="" w="9525">
+                <a14:hiddenLine xmlns="" xmlns:a14="http://schemas.microsoft.com/office/drawing/2010/main" w="9525">
                   <a:solidFill>
                     <a:srgbClr val="000000"/>
                   </a:solidFill>
@@ -2452,7 +2452,7 @@
             </a:ln>
             <a:extLst>
               <a:ext uri="{91240B29-F687-4f45-9708-019B960494DF}">
-                <a14:hiddenLine xmlns:a14="http://schemas.microsoft.com/office/drawing/2010/main" xmlns="" w="9525">
+                <a14:hiddenLine xmlns="" xmlns:a14="http://schemas.microsoft.com/office/drawing/2010/main" w="9525">
                   <a:solidFill>
                     <a:srgbClr val="000000"/>
                   </a:solidFill>
@@ -2542,7 +2542,7 @@
             </a:ln>
             <a:extLst>
               <a:ext uri="{91240B29-F687-4f45-9708-019B960494DF}">
-                <a14:hiddenLine xmlns:a14="http://schemas.microsoft.com/office/drawing/2010/main" xmlns="" w="9525">
+                <a14:hiddenLine xmlns="" xmlns:a14="http://schemas.microsoft.com/office/drawing/2010/main" w="9525">
                   <a:solidFill>
                     <a:srgbClr val="000000"/>
                   </a:solidFill>
@@ -2610,7 +2610,7 @@
             </a:ln>
             <a:extLst>
               <a:ext uri="{91240B29-F687-4f45-9708-019B960494DF}">
-                <a14:hiddenLine xmlns:a14="http://schemas.microsoft.com/office/drawing/2010/main" xmlns="" w="9525">
+                <a14:hiddenLine xmlns="" xmlns:a14="http://schemas.microsoft.com/office/drawing/2010/main" w="9525">
                   <a:solidFill>
                     <a:srgbClr val="000000"/>
                   </a:solidFill>
@@ -2700,7 +2700,7 @@
             </a:ln>
             <a:extLst>
               <a:ext uri="{91240B29-F687-4f45-9708-019B960494DF}">
-                <a14:hiddenLine xmlns:a14="http://schemas.microsoft.com/office/drawing/2010/main" xmlns="" w="9525">
+                <a14:hiddenLine xmlns="" xmlns:a14="http://schemas.microsoft.com/office/drawing/2010/main" w="9525">
                   <a:solidFill>
                     <a:srgbClr val="000000"/>
                   </a:solidFill>
@@ -2734,7 +2734,7 @@
             </a:ln>
             <a:extLst>
               <a:ext uri="{91240B29-F687-4f45-9708-019B960494DF}">
-                <a14:hiddenLine xmlns:a14="http://schemas.microsoft.com/office/drawing/2010/main" xmlns="" w="9525">
+                <a14:hiddenLine xmlns="" xmlns:a14="http://schemas.microsoft.com/office/drawing/2010/main" w="9525">
                   <a:solidFill>
                     <a:srgbClr val="000000"/>
                   </a:solidFill>
@@ -2824,7 +2824,7 @@
             </a:ln>
             <a:extLst>
               <a:ext uri="{91240B29-F687-4f45-9708-019B960494DF}">
-                <a14:hiddenLine xmlns:a14="http://schemas.microsoft.com/office/drawing/2010/main" xmlns="" w="9525">
+                <a14:hiddenLine xmlns="" xmlns:a14="http://schemas.microsoft.com/office/drawing/2010/main" w="9525">
                   <a:solidFill>
                     <a:srgbClr val="000000"/>
                   </a:solidFill>
@@ -2886,7 +2886,7 @@
             </a:ln>
             <a:extLst>
               <a:ext uri="{91240B29-F687-4f45-9708-019B960494DF}">
-                <a14:hiddenLine xmlns:a14="http://schemas.microsoft.com/office/drawing/2010/main" xmlns="" w="9525">
+                <a14:hiddenLine xmlns="" xmlns:a14="http://schemas.microsoft.com/office/drawing/2010/main" w="9525">
                   <a:solidFill>
                     <a:srgbClr val="000000"/>
                   </a:solidFill>
@@ -2948,7 +2948,7 @@
             </a:ln>
             <a:extLst>
               <a:ext uri="{91240B29-F687-4f45-9708-019B960494DF}">
-                <a14:hiddenLine xmlns:a14="http://schemas.microsoft.com/office/drawing/2010/main" xmlns="" w="9525">
+                <a14:hiddenLine xmlns="" xmlns:a14="http://schemas.microsoft.com/office/drawing/2010/main" w="9525">
                   <a:solidFill>
                     <a:srgbClr val="000000"/>
                   </a:solidFill>
@@ -3038,7 +3038,7 @@
             </a:ln>
             <a:extLst>
               <a:ext uri="{91240B29-F687-4f45-9708-019B960494DF}">
-                <a14:hiddenLine xmlns:a14="http://schemas.microsoft.com/office/drawing/2010/main" xmlns="" w="9525">
+                <a14:hiddenLine xmlns="" xmlns:a14="http://schemas.microsoft.com/office/drawing/2010/main" w="9525">
                   <a:solidFill>
                     <a:srgbClr val="000000"/>
                   </a:solidFill>
@@ -3106,7 +3106,7 @@
             </a:ln>
             <a:extLst>
               <a:ext uri="{91240B29-F687-4f45-9708-019B960494DF}">
-                <a14:hiddenLine xmlns:a14="http://schemas.microsoft.com/office/drawing/2010/main" xmlns="" w="9525">
+                <a14:hiddenLine xmlns="" xmlns:a14="http://schemas.microsoft.com/office/drawing/2010/main" w="9525">
                   <a:solidFill>
                     <a:srgbClr val="000000"/>
                   </a:solidFill>
@@ -3168,7 +3168,7 @@
             </a:ln>
             <a:extLst>
               <a:ext uri="{91240B29-F687-4f45-9708-019B960494DF}">
-                <a14:hiddenLine xmlns:a14="http://schemas.microsoft.com/office/drawing/2010/main" xmlns="" w="9525">
+                <a14:hiddenLine xmlns="" xmlns:a14="http://schemas.microsoft.com/office/drawing/2010/main" w="9525">
                   <a:solidFill>
                     <a:srgbClr val="000000"/>
                   </a:solidFill>
@@ -3258,7 +3258,7 @@
             </a:ln>
             <a:extLst>
               <a:ext uri="{91240B29-F687-4f45-9708-019B960494DF}">
-                <a14:hiddenLine xmlns:a14="http://schemas.microsoft.com/office/drawing/2010/main" xmlns="" w="9525">
+                <a14:hiddenLine xmlns="" xmlns:a14="http://schemas.microsoft.com/office/drawing/2010/main" w="9525">
                   <a:solidFill>
                     <a:srgbClr val="000000"/>
                   </a:solidFill>
@@ -3320,7 +3320,7 @@
             </a:ln>
             <a:extLst>
               <a:ext uri="{91240B29-F687-4f45-9708-019B960494DF}">
-                <a14:hiddenLine xmlns:a14="http://schemas.microsoft.com/office/drawing/2010/main" xmlns="" w="9525">
+                <a14:hiddenLine xmlns="" xmlns:a14="http://schemas.microsoft.com/office/drawing/2010/main" w="9525">
                   <a:solidFill>
                     <a:srgbClr val="000000"/>
                   </a:solidFill>
@@ -3410,7 +3410,7 @@
             </a:ln>
             <a:extLst>
               <a:ext uri="{91240B29-F687-4f45-9708-019B960494DF}">
-                <a14:hiddenLine xmlns:a14="http://schemas.microsoft.com/office/drawing/2010/main" xmlns="" w="9525">
+                <a14:hiddenLine xmlns="" xmlns:a14="http://schemas.microsoft.com/office/drawing/2010/main" w="9525">
                   <a:solidFill>
                     <a:srgbClr val="000000"/>
                   </a:solidFill>
@@ -3472,7 +3472,7 @@
             </a:ln>
             <a:extLst>
               <a:ext uri="{91240B29-F687-4f45-9708-019B960494DF}">
-                <a14:hiddenLine xmlns:a14="http://schemas.microsoft.com/office/drawing/2010/main" xmlns="" w="9525">
+                <a14:hiddenLine xmlns="" xmlns:a14="http://schemas.microsoft.com/office/drawing/2010/main" w="9525">
                   <a:solidFill>
                     <a:srgbClr val="000000"/>
                   </a:solidFill>
@@ -3562,7 +3562,7 @@
             </a:ln>
             <a:extLst>
               <a:ext uri="{91240B29-F687-4f45-9708-019B960494DF}">
-                <a14:hiddenLine xmlns:a14="http://schemas.microsoft.com/office/drawing/2010/main" xmlns="" w="9525">
+                <a14:hiddenLine xmlns="" xmlns:a14="http://schemas.microsoft.com/office/drawing/2010/main" w="9525">
                   <a:solidFill>
                     <a:srgbClr val="000000"/>
                   </a:solidFill>
@@ -3596,7 +3596,7 @@
             </a:ln>
             <a:extLst>
               <a:ext uri="{91240B29-F687-4f45-9708-019B960494DF}">
-                <a14:hiddenLine xmlns:a14="http://schemas.microsoft.com/office/drawing/2010/main" xmlns="" w="9525">
+                <a14:hiddenLine xmlns="" xmlns:a14="http://schemas.microsoft.com/office/drawing/2010/main" w="9525">
                   <a:solidFill>
                     <a:srgbClr val="000000"/>
                   </a:solidFill>
@@ -3661,7 +3661,7 @@
             </a:ln>
             <a:extLst>
               <a:ext uri="{91240B29-F687-4f45-9708-019B960494DF}">
-                <a14:hiddenLine xmlns:a14="http://schemas.microsoft.com/office/drawing/2010/main" xmlns="" w="9525">
+                <a14:hiddenLine xmlns="" xmlns:a14="http://schemas.microsoft.com/office/drawing/2010/main" w="9525">
                   <a:solidFill>
                     <a:srgbClr val="000000"/>
                   </a:solidFill>
@@ -3751,7 +3751,7 @@
             </a:ln>
             <a:extLst>
               <a:ext uri="{91240B29-F687-4f45-9708-019B960494DF}">
-                <a14:hiddenLine xmlns:a14="http://schemas.microsoft.com/office/drawing/2010/main" xmlns="" w="9525">
+                <a14:hiddenLine xmlns="" xmlns:a14="http://schemas.microsoft.com/office/drawing/2010/main" w="9525">
                   <a:solidFill>
                     <a:srgbClr val="000000"/>
                   </a:solidFill>
@@ -3813,7 +3813,7 @@
             </a:ln>
             <a:extLst>
               <a:ext uri="{91240B29-F687-4f45-9708-019B960494DF}">
-                <a14:hiddenLine xmlns:a14="http://schemas.microsoft.com/office/drawing/2010/main" xmlns="" w="9525">
+                <a14:hiddenLine xmlns="" xmlns:a14="http://schemas.microsoft.com/office/drawing/2010/main" w="9525">
                   <a:solidFill>
                     <a:srgbClr val="000000"/>
                   </a:solidFill>
@@ -3903,7 +3903,7 @@
             </a:ln>
             <a:extLst>
               <a:ext uri="{91240B29-F687-4f45-9708-019B960494DF}">
-                <a14:hiddenLine xmlns:a14="http://schemas.microsoft.com/office/drawing/2010/main" xmlns="" w="9525">
+                <a14:hiddenLine xmlns="" xmlns:a14="http://schemas.microsoft.com/office/drawing/2010/main" w="9525">
                   <a:solidFill>
                     <a:srgbClr val="000000"/>
                   </a:solidFill>
@@ -3993,7 +3993,7 @@
             </a:ln>
             <a:extLst>
               <a:ext uri="{91240B29-F687-4f45-9708-019B960494DF}">
-                <a14:hiddenLine xmlns:a14="http://schemas.microsoft.com/office/drawing/2010/main" xmlns="" w="9525">
+                <a14:hiddenLine xmlns="" xmlns:a14="http://schemas.microsoft.com/office/drawing/2010/main" w="9525">
                   <a:solidFill>
                     <a:srgbClr val="000000"/>
                   </a:solidFill>
@@ -4058,7 +4058,7 @@
             </a:ln>
             <a:extLst>
               <a:ext uri="{91240B29-F687-4f45-9708-019B960494DF}">
-                <a14:hiddenLine xmlns:a14="http://schemas.microsoft.com/office/drawing/2010/main" xmlns="" w="9525">
+                <a14:hiddenLine xmlns="" xmlns:a14="http://schemas.microsoft.com/office/drawing/2010/main" w="9525">
                   <a:solidFill>
                     <a:srgbClr val="000000"/>
                   </a:solidFill>
@@ -4120,7 +4120,7 @@
             </a:ln>
             <a:extLst>
               <a:ext uri="{91240B29-F687-4f45-9708-019B960494DF}">
-                <a14:hiddenLine xmlns:a14="http://schemas.microsoft.com/office/drawing/2010/main" xmlns="" w="9525">
+                <a14:hiddenLine xmlns="" xmlns:a14="http://schemas.microsoft.com/office/drawing/2010/main" w="9525">
                   <a:solidFill>
                     <a:srgbClr val="000000"/>
                   </a:solidFill>
@@ -4210,7 +4210,7 @@
             </a:ln>
             <a:extLst>
               <a:ext uri="{91240B29-F687-4f45-9708-019B960494DF}">
-                <a14:hiddenLine xmlns:a14="http://schemas.microsoft.com/office/drawing/2010/main" xmlns="" w="9525">
+                <a14:hiddenLine xmlns="" xmlns:a14="http://schemas.microsoft.com/office/drawing/2010/main" w="9525">
                   <a:solidFill>
                     <a:srgbClr val="000000"/>
                   </a:solidFill>
@@ -4300,7 +4300,7 @@
             </a:ln>
             <a:extLst>
               <a:ext uri="{91240B29-F687-4f45-9708-019B960494DF}">
-                <a14:hiddenLine xmlns:a14="http://schemas.microsoft.com/office/drawing/2010/main" xmlns="" w="9525">
+                <a14:hiddenLine xmlns="" xmlns:a14="http://schemas.microsoft.com/office/drawing/2010/main" w="9525">
                   <a:solidFill>
                     <a:srgbClr val="000000"/>
                   </a:solidFill>
@@ -4362,7 +4362,7 @@
             </a:ln>
             <a:extLst>
               <a:ext uri="{91240B29-F687-4f45-9708-019B960494DF}">
-                <a14:hiddenLine xmlns:a14="http://schemas.microsoft.com/office/drawing/2010/main" xmlns="" w="9525">
+                <a14:hiddenLine xmlns="" xmlns:a14="http://schemas.microsoft.com/office/drawing/2010/main" w="9525">
                   <a:solidFill>
                     <a:srgbClr val="000000"/>
                   </a:solidFill>
@@ -4482,7 +4482,7 @@
             </a:ln>
             <a:extLst>
               <a:ext uri="{91240B29-F687-4f45-9708-019B960494DF}">
-                <a14:hiddenLine xmlns:a14="http://schemas.microsoft.com/office/drawing/2010/main" xmlns="" w="9525">
+                <a14:hiddenLine xmlns="" xmlns:a14="http://schemas.microsoft.com/office/drawing/2010/main" w="9525">
                   <a:solidFill>
                     <a:srgbClr val="000000"/>
                   </a:solidFill>
@@ -4550,7 +4550,7 @@
             </a:ln>
             <a:extLst>
               <a:ext uri="{91240B29-F687-4f45-9708-019B960494DF}">
-                <a14:hiddenLine xmlns:a14="http://schemas.microsoft.com/office/drawing/2010/main" xmlns="" w="9525">
+                <a14:hiddenLine xmlns="" xmlns:a14="http://schemas.microsoft.com/office/drawing/2010/main" w="9525">
                   <a:solidFill>
                     <a:srgbClr val="000000"/>
                   </a:solidFill>
@@ -4640,7 +4640,7 @@
             </a:ln>
             <a:extLst>
               <a:ext uri="{91240B29-F687-4f45-9708-019B960494DF}">
-                <a14:hiddenLine xmlns:a14="http://schemas.microsoft.com/office/drawing/2010/main" xmlns="" w="9525">
+                <a14:hiddenLine xmlns="" xmlns:a14="http://schemas.microsoft.com/office/drawing/2010/main" w="9525">
                   <a:solidFill>
                     <a:srgbClr val="000000"/>
                   </a:solidFill>
@@ -9447,7 +9447,7 @@
           <a:noFill/>
           <a:extLst>
             <a:ext uri="{909E8E84-426E-40dd-AFC4-6F175D3DCCD1}">
-              <a14:hiddenFill xmlns:a14="http://schemas.microsoft.com/office/drawing/2010/main" xmlns="">
+              <a14:hiddenFill xmlns="" xmlns:a14="http://schemas.microsoft.com/office/drawing/2010/main">
                 <a:solidFill>
                   <a:srgbClr val="FFFFFF"/>
                 </a:solidFill>
@@ -9521,7 +9521,7 @@
               </a:ln>
               <a:extLst>
                 <a:ext uri="{91240B29-F687-4f45-9708-019B960494DF}">
-                  <a14:hiddenLine xmlns:a14="http://schemas.microsoft.com/office/drawing/2010/main" xmlns="" w="9525">
+                  <a14:hiddenLine xmlns="" xmlns:a14="http://schemas.microsoft.com/office/drawing/2010/main" w="9525">
                     <a:solidFill>
                       <a:srgbClr val="000000"/>
                     </a:solidFill>
@@ -9611,7 +9611,7 @@
               </a:ln>
               <a:extLst>
                 <a:ext uri="{91240B29-F687-4f45-9708-019B960494DF}">
-                  <a14:hiddenLine xmlns:a14="http://schemas.microsoft.com/office/drawing/2010/main" xmlns="" w="9525">
+                  <a14:hiddenLine xmlns="" xmlns:a14="http://schemas.microsoft.com/office/drawing/2010/main" w="9525">
                     <a:solidFill>
                       <a:srgbClr val="000000"/>
                     </a:solidFill>
@@ -9701,7 +9701,7 @@
               </a:ln>
               <a:extLst>
                 <a:ext uri="{91240B29-F687-4f45-9708-019B960494DF}">
-                  <a14:hiddenLine xmlns:a14="http://schemas.microsoft.com/office/drawing/2010/main" xmlns="" w="9525">
+                  <a14:hiddenLine xmlns="" xmlns:a14="http://schemas.microsoft.com/office/drawing/2010/main" w="9525">
                     <a:solidFill>
                       <a:srgbClr val="000000"/>
                     </a:solidFill>
@@ -9763,7 +9763,7 @@
               </a:ln>
               <a:extLst>
                 <a:ext uri="{91240B29-F687-4f45-9708-019B960494DF}">
-                  <a14:hiddenLine xmlns:a14="http://schemas.microsoft.com/office/drawing/2010/main" xmlns="" w="9525">
+                  <a14:hiddenLine xmlns="" xmlns:a14="http://schemas.microsoft.com/office/drawing/2010/main" w="9525">
                     <a:solidFill>
                       <a:srgbClr val="000000"/>
                     </a:solidFill>
@@ -9853,7 +9853,7 @@
               </a:ln>
               <a:extLst>
                 <a:ext uri="{91240B29-F687-4f45-9708-019B960494DF}">
-                  <a14:hiddenLine xmlns:a14="http://schemas.microsoft.com/office/drawing/2010/main" xmlns="" w="9525">
+                  <a14:hiddenLine xmlns="" xmlns:a14="http://schemas.microsoft.com/office/drawing/2010/main" w="9525">
                     <a:solidFill>
                       <a:srgbClr val="000000"/>
                     </a:solidFill>
@@ -9915,7 +9915,7 @@
               </a:ln>
               <a:extLst>
                 <a:ext uri="{91240B29-F687-4f45-9708-019B960494DF}">
-                  <a14:hiddenLine xmlns:a14="http://schemas.microsoft.com/office/drawing/2010/main" xmlns="" w="9525">
+                  <a14:hiddenLine xmlns="" xmlns:a14="http://schemas.microsoft.com/office/drawing/2010/main" w="9525">
                     <a:solidFill>
                       <a:srgbClr val="000000"/>
                     </a:solidFill>
@@ -9977,7 +9977,7 @@
               </a:ln>
               <a:extLst>
                 <a:ext uri="{91240B29-F687-4f45-9708-019B960494DF}">
-                  <a14:hiddenLine xmlns:a14="http://schemas.microsoft.com/office/drawing/2010/main" xmlns="" w="9525">
+                  <a14:hiddenLine xmlns="" xmlns:a14="http://schemas.microsoft.com/office/drawing/2010/main" w="9525">
                     <a:solidFill>
                       <a:srgbClr val="000000"/>
                     </a:solidFill>
@@ -10067,7 +10067,7 @@
               </a:ln>
               <a:extLst>
                 <a:ext uri="{91240B29-F687-4f45-9708-019B960494DF}">
-                  <a14:hiddenLine xmlns:a14="http://schemas.microsoft.com/office/drawing/2010/main" xmlns="" w="9525">
+                  <a14:hiddenLine xmlns="" xmlns:a14="http://schemas.microsoft.com/office/drawing/2010/main" w="9525">
                     <a:solidFill>
                       <a:srgbClr val="000000"/>
                     </a:solidFill>
@@ -10157,7 +10157,7 @@
               </a:ln>
               <a:extLst>
                 <a:ext uri="{91240B29-F687-4f45-9708-019B960494DF}">
-                  <a14:hiddenLine xmlns:a14="http://schemas.microsoft.com/office/drawing/2010/main" xmlns="" w="9525">
+                  <a14:hiddenLine xmlns="" xmlns:a14="http://schemas.microsoft.com/office/drawing/2010/main" w="9525">
                     <a:solidFill>
                       <a:srgbClr val="000000"/>
                     </a:solidFill>
@@ -10219,7 +10219,7 @@
               </a:ln>
               <a:extLst>
                 <a:ext uri="{91240B29-F687-4f45-9708-019B960494DF}">
-                  <a14:hiddenLine xmlns:a14="http://schemas.microsoft.com/office/drawing/2010/main" xmlns="" w="9525">
+                  <a14:hiddenLine xmlns="" xmlns:a14="http://schemas.microsoft.com/office/drawing/2010/main" w="9525">
                     <a:solidFill>
                       <a:srgbClr val="000000"/>
                     </a:solidFill>
@@ -10329,7 +10329,7 @@
               </a:ln>
               <a:extLst>
                 <a:ext uri="{91240B29-F687-4f45-9708-019B960494DF}">
-                  <a14:hiddenLine xmlns:a14="http://schemas.microsoft.com/office/drawing/2010/main" xmlns="" w="9525">
+                  <a14:hiddenLine xmlns="" xmlns:a14="http://schemas.microsoft.com/office/drawing/2010/main" w="9525">
                     <a:solidFill>
                       <a:srgbClr val="000000"/>
                     </a:solidFill>
@@ -10413,7 +10413,7 @@
               </a:ln>
               <a:extLst>
                 <a:ext uri="{91240B29-F687-4f45-9708-019B960494DF}">
-                  <a14:hiddenLine xmlns:a14="http://schemas.microsoft.com/office/drawing/2010/main" xmlns="" w="9525">
+                  <a14:hiddenLine xmlns="" xmlns:a14="http://schemas.microsoft.com/office/drawing/2010/main" w="9525">
                     <a:solidFill>
                       <a:srgbClr val="000000"/>
                     </a:solidFill>
@@ -10475,7 +10475,7 @@
               </a:ln>
               <a:extLst>
                 <a:ext uri="{91240B29-F687-4f45-9708-019B960494DF}">
-                  <a14:hiddenLine xmlns:a14="http://schemas.microsoft.com/office/drawing/2010/main" xmlns="" w="9525">
+                  <a14:hiddenLine xmlns="" xmlns:a14="http://schemas.microsoft.com/office/drawing/2010/main" w="9525">
                     <a:solidFill>
                       <a:srgbClr val="000000"/>
                     </a:solidFill>
@@ -10537,7 +10537,7 @@
               </a:ln>
               <a:extLst>
                 <a:ext uri="{91240B29-F687-4f45-9708-019B960494DF}">
-                  <a14:hiddenLine xmlns:a14="http://schemas.microsoft.com/office/drawing/2010/main" xmlns="" w="9525">
+                  <a14:hiddenLine xmlns="" xmlns:a14="http://schemas.microsoft.com/office/drawing/2010/main" w="9525">
                     <a:solidFill>
                       <a:srgbClr val="000000"/>
                     </a:solidFill>
@@ -10627,7 +10627,7 @@
               </a:ln>
               <a:extLst>
                 <a:ext uri="{91240B29-F687-4f45-9708-019B960494DF}">
-                  <a14:hiddenLine xmlns:a14="http://schemas.microsoft.com/office/drawing/2010/main" xmlns="" w="9525">
+                  <a14:hiddenLine xmlns="" xmlns:a14="http://schemas.microsoft.com/office/drawing/2010/main" w="9525">
                     <a:solidFill>
                       <a:srgbClr val="000000"/>
                     </a:solidFill>
@@ -10661,7 +10661,7 @@
               </a:ln>
               <a:extLst>
                 <a:ext uri="{91240B29-F687-4f45-9708-019B960494DF}">
-                  <a14:hiddenLine xmlns:a14="http://schemas.microsoft.com/office/drawing/2010/main" xmlns="" w="9525">
+                  <a14:hiddenLine xmlns="" xmlns:a14="http://schemas.microsoft.com/office/drawing/2010/main" w="9525">
                     <a:solidFill>
                       <a:srgbClr val="000000"/>
                     </a:solidFill>
@@ -10726,7 +10726,7 @@
               </a:ln>
               <a:extLst>
                 <a:ext uri="{91240B29-F687-4f45-9708-019B960494DF}">
-                  <a14:hiddenLine xmlns:a14="http://schemas.microsoft.com/office/drawing/2010/main" xmlns="" w="9525">
+                  <a14:hiddenLine xmlns="" xmlns:a14="http://schemas.microsoft.com/office/drawing/2010/main" w="9525">
                     <a:solidFill>
                       <a:srgbClr val="000000"/>
                     </a:solidFill>
@@ -10816,7 +10816,7 @@
               </a:ln>
               <a:extLst>
                 <a:ext uri="{91240B29-F687-4f45-9708-019B960494DF}">
-                  <a14:hiddenLine xmlns:a14="http://schemas.microsoft.com/office/drawing/2010/main" xmlns="" w="9525">
+                  <a14:hiddenLine xmlns="" xmlns:a14="http://schemas.microsoft.com/office/drawing/2010/main" w="9525">
                     <a:solidFill>
                       <a:srgbClr val="000000"/>
                     </a:solidFill>
@@ -10878,7 +10878,7 @@
               </a:ln>
               <a:extLst>
                 <a:ext uri="{91240B29-F687-4f45-9708-019B960494DF}">
-                  <a14:hiddenLine xmlns:a14="http://schemas.microsoft.com/office/drawing/2010/main" xmlns="" w="9525">
+                  <a14:hiddenLine xmlns="" xmlns:a14="http://schemas.microsoft.com/office/drawing/2010/main" w="9525">
                     <a:solidFill>
                       <a:srgbClr val="000000"/>
                     </a:solidFill>
@@ -10968,7 +10968,7 @@
               </a:ln>
               <a:extLst>
                 <a:ext uri="{91240B29-F687-4f45-9708-019B960494DF}">
-                  <a14:hiddenLine xmlns:a14="http://schemas.microsoft.com/office/drawing/2010/main" xmlns="" w="9525">
+                  <a14:hiddenLine xmlns="" xmlns:a14="http://schemas.microsoft.com/office/drawing/2010/main" w="9525">
                     <a:solidFill>
                       <a:srgbClr val="000000"/>
                     </a:solidFill>
@@ -11033,7 +11033,7 @@
               </a:ln>
               <a:extLst>
                 <a:ext uri="{91240B29-F687-4f45-9708-019B960494DF}">
-                  <a14:hiddenLine xmlns:a14="http://schemas.microsoft.com/office/drawing/2010/main" xmlns="" w="9525">
+                  <a14:hiddenLine xmlns="" xmlns:a14="http://schemas.microsoft.com/office/drawing/2010/main" w="9525">
                     <a:solidFill>
                       <a:srgbClr val="000000"/>
                     </a:solidFill>
@@ -11095,7 +11095,7 @@
               </a:ln>
               <a:extLst>
                 <a:ext uri="{91240B29-F687-4f45-9708-019B960494DF}">
-                  <a14:hiddenLine xmlns:a14="http://schemas.microsoft.com/office/drawing/2010/main" xmlns="" w="9525">
+                  <a14:hiddenLine xmlns="" xmlns:a14="http://schemas.microsoft.com/office/drawing/2010/main" w="9525">
                     <a:solidFill>
                       <a:srgbClr val="000000"/>
                     </a:solidFill>
@@ -11185,7 +11185,7 @@
               </a:ln>
               <a:extLst>
                 <a:ext uri="{91240B29-F687-4f45-9708-019B960494DF}">
-                  <a14:hiddenLine xmlns:a14="http://schemas.microsoft.com/office/drawing/2010/main" xmlns="" w="9525">
+                  <a14:hiddenLine xmlns="" xmlns:a14="http://schemas.microsoft.com/office/drawing/2010/main" w="9525">
                     <a:solidFill>
                       <a:srgbClr val="000000"/>
                     </a:solidFill>
@@ -11275,7 +11275,7 @@
               </a:ln>
               <a:extLst>
                 <a:ext uri="{91240B29-F687-4f45-9708-019B960494DF}">
-                  <a14:hiddenLine xmlns:a14="http://schemas.microsoft.com/office/drawing/2010/main" xmlns="" w="9525">
+                  <a14:hiddenLine xmlns="" xmlns:a14="http://schemas.microsoft.com/office/drawing/2010/main" w="9525">
                     <a:solidFill>
                       <a:srgbClr val="000000"/>
                     </a:solidFill>
@@ -11340,7 +11340,7 @@
               </a:ln>
               <a:extLst>
                 <a:ext uri="{91240B29-F687-4f45-9708-019B960494DF}">
-                  <a14:hiddenLine xmlns:a14="http://schemas.microsoft.com/office/drawing/2010/main" xmlns="" w="9525">
+                  <a14:hiddenLine xmlns="" xmlns:a14="http://schemas.microsoft.com/office/drawing/2010/main" w="9525">
                     <a:solidFill>
                       <a:srgbClr val="000000"/>
                     </a:solidFill>
@@ -11460,7 +11460,7 @@
               </a:ln>
               <a:extLst>
                 <a:ext uri="{91240B29-F687-4f45-9708-019B960494DF}">
-                  <a14:hiddenLine xmlns:a14="http://schemas.microsoft.com/office/drawing/2010/main" xmlns="" w="9525">
+                  <a14:hiddenLine xmlns="" xmlns:a14="http://schemas.microsoft.com/office/drawing/2010/main" w="9525">
                     <a:solidFill>
                       <a:srgbClr val="000000"/>
                     </a:solidFill>
@@ -11558,7 +11558,7 @@
               </a:ln>
               <a:extLst>
                 <a:ext uri="{91240B29-F687-4f45-9708-019B960494DF}">
-                  <a14:hiddenLine xmlns:a14="http://schemas.microsoft.com/office/drawing/2010/main" xmlns="" w="9525">
+                  <a14:hiddenLine xmlns="" xmlns:a14="http://schemas.microsoft.com/office/drawing/2010/main" w="9525">
                     <a:solidFill>
                       <a:srgbClr val="000000"/>
                     </a:solidFill>
@@ -11673,7 +11673,7 @@
               </a:ln>
               <a:extLst>
                 <a:ext uri="{91240B29-F687-4f45-9708-019B960494DF}">
-                  <a14:hiddenLine xmlns:a14="http://schemas.microsoft.com/office/drawing/2010/main" xmlns="" w="9525">
+                  <a14:hiddenLine xmlns="" xmlns:a14="http://schemas.microsoft.com/office/drawing/2010/main" w="9525">
                     <a:solidFill>
                       <a:srgbClr val="000000"/>
                     </a:solidFill>
@@ -11763,7 +11763,7 @@
               </a:ln>
               <a:extLst>
                 <a:ext uri="{91240B29-F687-4f45-9708-019B960494DF}">
-                  <a14:hiddenLine xmlns:a14="http://schemas.microsoft.com/office/drawing/2010/main" xmlns="" w="9525">
+                  <a14:hiddenLine xmlns="" xmlns:a14="http://schemas.microsoft.com/office/drawing/2010/main" w="9525">
                     <a:solidFill>
                       <a:srgbClr val="000000"/>
                     </a:solidFill>
@@ -11828,7 +11828,7 @@
               </a:ln>
               <a:extLst>
                 <a:ext uri="{91240B29-F687-4f45-9708-019B960494DF}">
-                  <a14:hiddenLine xmlns:a14="http://schemas.microsoft.com/office/drawing/2010/main" xmlns="" w="9525">
+                  <a14:hiddenLine xmlns="" xmlns:a14="http://schemas.microsoft.com/office/drawing/2010/main" w="9525">
                     <a:solidFill>
                       <a:srgbClr val="000000"/>
                     </a:solidFill>
@@ -11918,7 +11918,7 @@
               </a:ln>
               <a:extLst>
                 <a:ext uri="{91240B29-F687-4f45-9708-019B960494DF}">
-                  <a14:hiddenLine xmlns:a14="http://schemas.microsoft.com/office/drawing/2010/main" xmlns="" w="9525">
+                  <a14:hiddenLine xmlns="" xmlns:a14="http://schemas.microsoft.com/office/drawing/2010/main" w="9525">
                     <a:solidFill>
                       <a:srgbClr val="000000"/>
                     </a:solidFill>
@@ -11986,7 +11986,7 @@
               </a:ln>
               <a:extLst>
                 <a:ext uri="{91240B29-F687-4f45-9708-019B960494DF}">
-                  <a14:hiddenLine xmlns:a14="http://schemas.microsoft.com/office/drawing/2010/main" xmlns="" w="9525">
+                  <a14:hiddenLine xmlns="" xmlns:a14="http://schemas.microsoft.com/office/drawing/2010/main" w="9525">
                     <a:solidFill>
                       <a:srgbClr val="000000"/>
                     </a:solidFill>
@@ -12076,7 +12076,7 @@
               </a:ln>
               <a:extLst>
                 <a:ext uri="{91240B29-F687-4f45-9708-019B960494DF}">
-                  <a14:hiddenLine xmlns:a14="http://schemas.microsoft.com/office/drawing/2010/main" xmlns="" w="9525">
+                  <a14:hiddenLine xmlns="" xmlns:a14="http://schemas.microsoft.com/office/drawing/2010/main" w="9525">
                     <a:solidFill>
                       <a:srgbClr val="000000"/>
                     </a:solidFill>
@@ -12144,7 +12144,7 @@
               </a:ln>
               <a:extLst>
                 <a:ext uri="{91240B29-F687-4f45-9708-019B960494DF}">
-                  <a14:hiddenLine xmlns:a14="http://schemas.microsoft.com/office/drawing/2010/main" xmlns="" w="9525">
+                  <a14:hiddenLine xmlns="" xmlns:a14="http://schemas.microsoft.com/office/drawing/2010/main" w="9525">
                     <a:solidFill>
                       <a:srgbClr val="000000"/>
                     </a:solidFill>
@@ -12234,7 +12234,7 @@
               </a:ln>
               <a:extLst>
                 <a:ext uri="{91240B29-F687-4f45-9708-019B960494DF}">
-                  <a14:hiddenLine xmlns:a14="http://schemas.microsoft.com/office/drawing/2010/main" xmlns="" w="9525">
+                  <a14:hiddenLine xmlns="" xmlns:a14="http://schemas.microsoft.com/office/drawing/2010/main" w="9525">
                     <a:solidFill>
                       <a:srgbClr val="000000"/>
                     </a:solidFill>
@@ -12268,7 +12268,7 @@
               </a:ln>
               <a:extLst>
                 <a:ext uri="{91240B29-F687-4f45-9708-019B960494DF}">
-                  <a14:hiddenLine xmlns:a14="http://schemas.microsoft.com/office/drawing/2010/main" xmlns="" w="9525">
+                  <a14:hiddenLine xmlns="" xmlns:a14="http://schemas.microsoft.com/office/drawing/2010/main" w="9525">
                     <a:solidFill>
                       <a:srgbClr val="000000"/>
                     </a:solidFill>
@@ -14434,216 +14434,6 @@
               </a:lnSpc>
             </a:pPr>
             <a:r>
-              <a:rPr lang="pt-BR" dirty="0"/>
-              <a:t>Component Diagram</a:t>
-            </a:r>
-          </a:p>
-          <a:p>
-            <a:pPr>
-              <a:lnSpc>
-                <a:spcPct val="100000"/>
-              </a:lnSpc>
-            </a:pPr>
-            <a:r>
-              <a:rPr lang="pt-BR" dirty="0"/>
-              <a:t>Class Diagram </a:t>
-            </a:r>
-          </a:p>
-          <a:p>
-            <a:pPr>
-              <a:lnSpc>
-                <a:spcPct val="100000"/>
-              </a:lnSpc>
-            </a:pPr>
-            <a:r>
-              <a:rPr lang="pt-BR" dirty="0"/>
-              <a:t>Sequence Diagram </a:t>
-            </a:r>
-          </a:p>
-          <a:p>
-            <a:pPr>
-              <a:lnSpc>
-                <a:spcPct val="100000"/>
-              </a:lnSpc>
-            </a:pPr>
-            <a:r>
-              <a:rPr lang="pt-BR" dirty="0"/>
-              <a:t>State Diagram </a:t>
-            </a:r>
-          </a:p>
-          <a:p>
-            <a:pPr>
-              <a:lnSpc>
-                <a:spcPct val="100000"/>
-              </a:lnSpc>
-            </a:pPr>
-            <a:r>
-              <a:rPr lang="pt-BR" dirty="0"/>
-              <a:t>Activity Diagram </a:t>
-            </a:r>
-          </a:p>
-          <a:p>
-            <a:pPr>
-              <a:lnSpc>
-                <a:spcPct val="100000"/>
-              </a:lnSpc>
-            </a:pPr>
-            <a:r>
-              <a:rPr lang="pt-BR" dirty="0"/>
-              <a:t>Layer Diagram </a:t>
-            </a:r>
-          </a:p>
-          <a:p>
-            <a:pPr>
-              <a:lnSpc>
-                <a:spcPct val="100000"/>
-              </a:lnSpc>
-            </a:pPr>
-            <a:r>
-              <a:rPr lang="pt-BR" dirty="0"/>
-              <a:t>Use Case Diagram</a:t>
-            </a:r>
-          </a:p>
-          <a:p>
-            <a:pPr>
-              <a:lnSpc>
-                <a:spcPct val="100000"/>
-              </a:lnSpc>
-            </a:pPr>
-            <a:r>
-              <a:rPr lang="pt-BR" dirty="0"/>
-              <a:t>There are others...</a:t>
-            </a:r>
-            <a:endParaRPr lang="en-US" dirty="0"/>
-          </a:p>
-        </p:txBody>
-      </p:sp>
-      <p:sp>
-        <p:nvSpPr>
-          <p:cNvPr id="4" name="Title 3"/>
-          <p:cNvSpPr>
-            <a:spLocks noGrp="1"/>
-          </p:cNvSpPr>
-          <p:nvPr>
-            <p:ph type="title"/>
-          </p:nvPr>
-        </p:nvSpPr>
-        <p:spPr/>
-        <p:txBody>
-          <a:bodyPr/>
-          <a:lstStyle/>
-          <a:p>
-            <a:r>
-              <a:rPr lang="en-GB" dirty="0"/>
-              <a:t>UML </a:t>
-            </a:r>
-            <a:r>
-              <a:rPr lang="en-US" dirty="0"/>
-              <a:t>Diagram</a:t>
-            </a:r>
-            <a:r>
-              <a:rPr lang="en-GB" dirty="0"/>
-              <a:t> Types</a:t>
-            </a:r>
-            <a:endParaRPr lang="en-US" dirty="0"/>
-          </a:p>
-        </p:txBody>
-      </p:sp>
-    </p:spTree>
-    <p:extLst>
-      <p:ext uri="{BB962C8B-B14F-4D97-AF65-F5344CB8AC3E}">
-        <p14:creationId xmlns:p14="http://schemas.microsoft.com/office/powerpoint/2010/main" val="1224382695"/>
-      </p:ext>
-    </p:extLst>
-  </p:cSld>
-  <p:clrMapOvr>
-    <a:masterClrMapping/>
-  </p:clrMapOvr>
-</p:sld>
-</file>
-
-<file path=ppt/slides/slide18.xml><?xml version="1.0" encoding="utf-8"?>
-<p:sld xmlns:a="http://schemas.openxmlformats.org/drawingml/2006/main" xmlns:r="http://schemas.openxmlformats.org/officeDocument/2006/relationships" xmlns:p="http://schemas.openxmlformats.org/presentationml/2006/main">
-  <p:cSld>
-    <p:spTree>
-      <p:nvGrpSpPr>
-        <p:cNvPr id="1" name=""/>
-        <p:cNvGrpSpPr/>
-        <p:nvPr/>
-      </p:nvGrpSpPr>
-      <p:grpSpPr>
-        <a:xfrm>
-          <a:off x="0" y="0"/>
-          <a:ext cx="0" cy="0"/>
-          <a:chOff x="0" y="0"/>
-          <a:chExt cx="0" cy="0"/>
-        </a:xfrm>
-      </p:grpSpPr>
-      <p:sp>
-        <p:nvSpPr>
-          <p:cNvPr id="7" name="Slide Number Placeholder 3"/>
-          <p:cNvSpPr>
-            <a:spLocks noGrp="1"/>
-          </p:cNvSpPr>
-          <p:nvPr>
-            <p:ph type="sldNum" sz="quarter" idx="4294967295"/>
-          </p:nvPr>
-        </p:nvSpPr>
-        <p:spPr>
-          <a:xfrm>
-            <a:off x="11568000" y="6525003"/>
-            <a:ext cx="428822" cy="196477"/>
-          </a:xfrm>
-          <a:prstGeom prst="rect">
-            <a:avLst/>
-          </a:prstGeom>
-        </p:spPr>
-        <p:txBody>
-          <a:bodyPr/>
-          <a:lstStyle/>
-          <a:p>
-            <a:pPr>
-              <a:defRPr/>
-            </a:pPr>
-            <a:fld id="{58452FF4-89E3-4D1B-9927-2DBDC00E58D7}" type="slidenum">
-              <a:rPr lang="en-US" smtClean="0"/>
-              <a:pPr>
-                <a:defRPr/>
-              </a:pPr>
-              <a:t>18</a:t>
-            </a:fld>
-            <a:endParaRPr lang="en-US" dirty="0"/>
-          </a:p>
-        </p:txBody>
-      </p:sp>
-      <p:sp>
-        <p:nvSpPr>
-          <p:cNvPr id="5" name="Content Placeholder 4"/>
-          <p:cNvSpPr>
-            <a:spLocks noGrp="1"/>
-          </p:cNvSpPr>
-          <p:nvPr>
-            <p:ph idx="1"/>
-          </p:nvPr>
-        </p:nvSpPr>
-        <p:spPr>
-          <a:xfrm>
-            <a:off x="1141413" y="1712549"/>
-            <a:ext cx="11696797" cy="5458202"/>
-          </a:xfrm>
-        </p:spPr>
-        <p:txBody>
-          <a:bodyPr>
-            <a:normAutofit/>
-          </a:bodyPr>
-          <a:lstStyle/>
-          <a:p>
-            <a:pPr>
-              <a:lnSpc>
-                <a:spcPct val="100000"/>
-              </a:lnSpc>
-            </a:pPr>
-            <a:r>
               <a:rPr lang="en-US" dirty="0"/>
               <a:t>Shows components</a:t>
             </a:r>
@@ -14780,6 +14570,216 @@
     <p:extLst>
       <p:ext uri="{BB962C8B-B14F-4D97-AF65-F5344CB8AC3E}">
         <p14:creationId xmlns:p14="http://schemas.microsoft.com/office/powerpoint/2010/main" val="3286869937"/>
+      </p:ext>
+    </p:extLst>
+  </p:cSld>
+  <p:clrMapOvr>
+    <a:masterClrMapping/>
+  </p:clrMapOvr>
+</p:sld>
+</file>
+
+<file path=ppt/slides/slide18.xml><?xml version="1.0" encoding="utf-8"?>
+<p:sld xmlns:a="http://schemas.openxmlformats.org/drawingml/2006/main" xmlns:r="http://schemas.openxmlformats.org/officeDocument/2006/relationships" xmlns:p="http://schemas.openxmlformats.org/presentationml/2006/main">
+  <p:cSld>
+    <p:spTree>
+      <p:nvGrpSpPr>
+        <p:cNvPr id="1" name=""/>
+        <p:cNvGrpSpPr/>
+        <p:nvPr/>
+      </p:nvGrpSpPr>
+      <p:grpSpPr>
+        <a:xfrm>
+          <a:off x="0" y="0"/>
+          <a:ext cx="0" cy="0"/>
+          <a:chOff x="0" y="0"/>
+          <a:chExt cx="0" cy="0"/>
+        </a:xfrm>
+      </p:grpSpPr>
+      <p:sp>
+        <p:nvSpPr>
+          <p:cNvPr id="7" name="Slide Number Placeholder 3"/>
+          <p:cNvSpPr>
+            <a:spLocks noGrp="1"/>
+          </p:cNvSpPr>
+          <p:nvPr>
+            <p:ph type="sldNum" sz="quarter" idx="4294967295"/>
+          </p:nvPr>
+        </p:nvSpPr>
+        <p:spPr>
+          <a:xfrm>
+            <a:off x="11568000" y="6525003"/>
+            <a:ext cx="428822" cy="196477"/>
+          </a:xfrm>
+          <a:prstGeom prst="rect">
+            <a:avLst/>
+          </a:prstGeom>
+        </p:spPr>
+        <p:txBody>
+          <a:bodyPr/>
+          <a:lstStyle/>
+          <a:p>
+            <a:pPr>
+              <a:defRPr/>
+            </a:pPr>
+            <a:fld id="{58452FF4-89E3-4D1B-9927-2DBDC00E58D7}" type="slidenum">
+              <a:rPr lang="en-US" smtClean="0"/>
+              <a:pPr>
+                <a:defRPr/>
+              </a:pPr>
+              <a:t>18</a:t>
+            </a:fld>
+            <a:endParaRPr lang="en-US" dirty="0"/>
+          </a:p>
+        </p:txBody>
+      </p:sp>
+      <p:sp>
+        <p:nvSpPr>
+          <p:cNvPr id="5" name="Content Placeholder 4"/>
+          <p:cNvSpPr>
+            <a:spLocks noGrp="1"/>
+          </p:cNvSpPr>
+          <p:nvPr>
+            <p:ph idx="1"/>
+          </p:nvPr>
+        </p:nvSpPr>
+        <p:spPr>
+          <a:xfrm>
+            <a:off x="1141413" y="1712549"/>
+            <a:ext cx="11696797" cy="5458202"/>
+          </a:xfrm>
+        </p:spPr>
+        <p:txBody>
+          <a:bodyPr>
+            <a:normAutofit/>
+          </a:bodyPr>
+          <a:lstStyle/>
+          <a:p>
+            <a:pPr>
+              <a:lnSpc>
+                <a:spcPct val="100000"/>
+              </a:lnSpc>
+            </a:pPr>
+            <a:r>
+              <a:rPr lang="pt-BR" dirty="0"/>
+              <a:t>Component Diagram</a:t>
+            </a:r>
+          </a:p>
+          <a:p>
+            <a:pPr>
+              <a:lnSpc>
+                <a:spcPct val="100000"/>
+              </a:lnSpc>
+            </a:pPr>
+            <a:r>
+              <a:rPr lang="pt-BR" dirty="0"/>
+              <a:t>Class Diagram </a:t>
+            </a:r>
+          </a:p>
+          <a:p>
+            <a:pPr>
+              <a:lnSpc>
+                <a:spcPct val="100000"/>
+              </a:lnSpc>
+            </a:pPr>
+            <a:r>
+              <a:rPr lang="pt-BR" dirty="0"/>
+              <a:t>Sequence Diagram </a:t>
+            </a:r>
+          </a:p>
+          <a:p>
+            <a:pPr>
+              <a:lnSpc>
+                <a:spcPct val="100000"/>
+              </a:lnSpc>
+            </a:pPr>
+            <a:r>
+              <a:rPr lang="pt-BR" dirty="0"/>
+              <a:t>State Diagram </a:t>
+            </a:r>
+          </a:p>
+          <a:p>
+            <a:pPr>
+              <a:lnSpc>
+                <a:spcPct val="100000"/>
+              </a:lnSpc>
+            </a:pPr>
+            <a:r>
+              <a:rPr lang="pt-BR" dirty="0"/>
+              <a:t>Activity Diagram </a:t>
+            </a:r>
+          </a:p>
+          <a:p>
+            <a:pPr>
+              <a:lnSpc>
+                <a:spcPct val="100000"/>
+              </a:lnSpc>
+            </a:pPr>
+            <a:r>
+              <a:rPr lang="pt-BR" dirty="0"/>
+              <a:t>Layer Diagram </a:t>
+            </a:r>
+          </a:p>
+          <a:p>
+            <a:pPr>
+              <a:lnSpc>
+                <a:spcPct val="100000"/>
+              </a:lnSpc>
+            </a:pPr>
+            <a:r>
+              <a:rPr lang="pt-BR" dirty="0"/>
+              <a:t>Use Case Diagram</a:t>
+            </a:r>
+          </a:p>
+          <a:p>
+            <a:pPr>
+              <a:lnSpc>
+                <a:spcPct val="100000"/>
+              </a:lnSpc>
+            </a:pPr>
+            <a:r>
+              <a:rPr lang="pt-BR" dirty="0"/>
+              <a:t>There are others...</a:t>
+            </a:r>
+            <a:endParaRPr lang="en-US" dirty="0"/>
+          </a:p>
+        </p:txBody>
+      </p:sp>
+      <p:sp>
+        <p:nvSpPr>
+          <p:cNvPr id="4" name="Title 3"/>
+          <p:cNvSpPr>
+            <a:spLocks noGrp="1"/>
+          </p:cNvSpPr>
+          <p:nvPr>
+            <p:ph type="title"/>
+          </p:nvPr>
+        </p:nvSpPr>
+        <p:spPr/>
+        <p:txBody>
+          <a:bodyPr/>
+          <a:lstStyle/>
+          <a:p>
+            <a:r>
+              <a:rPr lang="en-GB" dirty="0"/>
+              <a:t>UML </a:t>
+            </a:r>
+            <a:r>
+              <a:rPr lang="en-US" dirty="0"/>
+              <a:t>Diagram</a:t>
+            </a:r>
+            <a:r>
+              <a:rPr lang="en-GB" dirty="0"/>
+              <a:t> Types</a:t>
+            </a:r>
+            <a:endParaRPr lang="en-US" dirty="0"/>
+          </a:p>
+        </p:txBody>
+      </p:sp>
+    </p:spTree>
+    <p:extLst>
+      <p:ext uri="{BB962C8B-B14F-4D97-AF65-F5344CB8AC3E}">
+        <p14:creationId xmlns:p14="http://schemas.microsoft.com/office/powerpoint/2010/main" val="1224382695"/>
       </p:ext>
     </p:extLst>
   </p:cSld>

</xml_diff>